<commit_message>
Aula T2-S05 e T2-S06
</commit_message>
<xml_diff>
--- a/aulas/t/SCO-T2-S03-S04.pptx
+++ b/aulas/t/SCO-T2-S03-S04.pptx
@@ -9592,8 +9592,12 @@
               <a:buChar char="Ø"/>
             </a:pPr>
             <a:r>
+              <a:rPr lang="pt-PT" sz="2000" i="0"/>
+              <a:t>2 </a:t>
+            </a:r>
+            <a:r>
               <a:rPr lang="pt-PT" sz="2000" i="0" dirty="0"/>
-              <a:t>200 conjuntos (base e standard) de 2000 questões (em 1000000) + 100 questão (em 1000 do conjunto Hard)</a:t>
+              <a:t>conjuntos (base e standard) de 2000 questões (em 1000000) + 100 questão (em 1000 do conjunto Hard)</a:t>
             </a:r>
             <a:r>
               <a:rPr lang="pt-PT" sz="2000" b="0" i="0" dirty="0"/>

</xml_diff>